<commit_message>
[ADD] slides session 20
</commit_message>
<xml_diff>
--- a/lectures/TAC-Session20.pptx
+++ b/lectures/TAC-Session20.pptx
@@ -116,8 +116,7 @@
 <file path=ppt/revisionInfo.xml><?xml version="1.0" encoding="utf-8"?>
 <p1510:revInfo xmlns:a="http://schemas.openxmlformats.org/drawingml/2006/main" xmlns:r="http://schemas.openxmlformats.org/officeDocument/2006/relationships" xmlns:p1510="http://schemas.microsoft.com/office/powerpoint/2015/10/main">
   <p1510:revLst>
-    <p1510:client id="{088544F1-E55A-46DA-9661-86307C743D84}" v="3" dt="2024-11-18T14:45:25.011"/>
-    <p1510:client id="{F8464EE7-544F-CE8C-A0BB-9F8010C6D72B}" v="130" dt="2024-11-18T14:46:41.287"/>
+    <p1510:client id="{37911541-298E-C079-940D-AA4714B0D266}" v="13" dt="2024-11-28T16:23:12.814"/>
   </p1510:revLst>
 </p1510:revInfo>
 </file>
@@ -251,7 +250,7 @@
           <a:p>
             <a:fld id="{E431C0BB-DC71-4713-A787-95011EDB8CA8}" type="datetimeFigureOut">
               <a:rPr lang="pt-PT" smtClean="0"/>
-              <a:t>23/11/2024</a:t>
+              <a:t>28/11/2024</a:t>
             </a:fld>
             <a:endParaRPr lang="pt-PT"/>
           </a:p>
@@ -419,7 +418,7 @@
           <a:p>
             <a:fld id="{E431C0BB-DC71-4713-A787-95011EDB8CA8}" type="datetimeFigureOut">
               <a:rPr lang="pt-PT" smtClean="0"/>
-              <a:t>23/11/2024</a:t>
+              <a:t>28/11/2024</a:t>
             </a:fld>
             <a:endParaRPr lang="pt-PT"/>
           </a:p>
@@ -597,7 +596,7 @@
           <a:p>
             <a:fld id="{E431C0BB-DC71-4713-A787-95011EDB8CA8}" type="datetimeFigureOut">
               <a:rPr lang="pt-PT" smtClean="0"/>
-              <a:t>23/11/2024</a:t>
+              <a:t>28/11/2024</a:t>
             </a:fld>
             <a:endParaRPr lang="pt-PT"/>
           </a:p>
@@ -765,7 +764,7 @@
           <a:p>
             <a:fld id="{E431C0BB-DC71-4713-A787-95011EDB8CA8}" type="datetimeFigureOut">
               <a:rPr lang="pt-PT" smtClean="0"/>
-              <a:t>23/11/2024</a:t>
+              <a:t>28/11/2024</a:t>
             </a:fld>
             <a:endParaRPr lang="pt-PT"/>
           </a:p>
@@ -1010,7 +1009,7 @@
           <a:p>
             <a:fld id="{E431C0BB-DC71-4713-A787-95011EDB8CA8}" type="datetimeFigureOut">
               <a:rPr lang="pt-PT" smtClean="0"/>
-              <a:t>23/11/2024</a:t>
+              <a:t>28/11/2024</a:t>
             </a:fld>
             <a:endParaRPr lang="pt-PT"/>
           </a:p>
@@ -1239,7 +1238,7 @@
           <a:p>
             <a:fld id="{E431C0BB-DC71-4713-A787-95011EDB8CA8}" type="datetimeFigureOut">
               <a:rPr lang="pt-PT" smtClean="0"/>
-              <a:t>23/11/2024</a:t>
+              <a:t>28/11/2024</a:t>
             </a:fld>
             <a:endParaRPr lang="pt-PT"/>
           </a:p>
@@ -1603,7 +1602,7 @@
           <a:p>
             <a:fld id="{E431C0BB-DC71-4713-A787-95011EDB8CA8}" type="datetimeFigureOut">
               <a:rPr lang="pt-PT" smtClean="0"/>
-              <a:t>23/11/2024</a:t>
+              <a:t>28/11/2024</a:t>
             </a:fld>
             <a:endParaRPr lang="pt-PT"/>
           </a:p>
@@ -1720,7 +1719,7 @@
           <a:p>
             <a:fld id="{E431C0BB-DC71-4713-A787-95011EDB8CA8}" type="datetimeFigureOut">
               <a:rPr lang="pt-PT" smtClean="0"/>
-              <a:t>23/11/2024</a:t>
+              <a:t>28/11/2024</a:t>
             </a:fld>
             <a:endParaRPr lang="pt-PT"/>
           </a:p>
@@ -1815,7 +1814,7 @@
           <a:p>
             <a:fld id="{E431C0BB-DC71-4713-A787-95011EDB8CA8}" type="datetimeFigureOut">
               <a:rPr lang="pt-PT" smtClean="0"/>
-              <a:t>23/11/2024</a:t>
+              <a:t>28/11/2024</a:t>
             </a:fld>
             <a:endParaRPr lang="pt-PT"/>
           </a:p>
@@ -2090,7 +2089,7 @@
           <a:p>
             <a:fld id="{E431C0BB-DC71-4713-A787-95011EDB8CA8}" type="datetimeFigureOut">
               <a:rPr lang="pt-PT" smtClean="0"/>
-              <a:t>23/11/2024</a:t>
+              <a:t>28/11/2024</a:t>
             </a:fld>
             <a:endParaRPr lang="pt-PT"/>
           </a:p>
@@ -2342,7 +2341,7 @@
           <a:p>
             <a:fld id="{E431C0BB-DC71-4713-A787-95011EDB8CA8}" type="datetimeFigureOut">
               <a:rPr lang="pt-PT" smtClean="0"/>
-              <a:t>23/11/2024</a:t>
+              <a:t>28/11/2024</a:t>
             </a:fld>
             <a:endParaRPr lang="pt-PT"/>
           </a:p>
@@ -2553,7 +2552,7 @@
           <a:p>
             <a:fld id="{E431C0BB-DC71-4713-A787-95011EDB8CA8}" type="datetimeFigureOut">
               <a:rPr lang="pt-PT" smtClean="0"/>
-              <a:t>23/11/2024</a:t>
+              <a:t>28/11/2024</a:t>
             </a:fld>
             <a:endParaRPr lang="pt-PT"/>
           </a:p>
@@ -4628,21 +4627,7 @@
                 <a:ea typeface="+mn-lt"/>
                 <a:cs typeface="+mn-lt"/>
               </a:rPr>
-              <a:t>: "</a:t>
-            </a:r>
-            <a:r>
-              <a:rPr lang="pt-PT" sz="3000" dirty="0" err="1">
-                <a:ea typeface="+mn-lt"/>
-                <a:cs typeface="+mn-lt"/>
-              </a:rPr>
-              <a:t>recommender_system_exercises.ipynb</a:t>
-            </a:r>
-            <a:r>
-              <a:rPr lang="pt-PT" sz="3000" dirty="0">
-                <a:ea typeface="+mn-lt"/>
-                <a:cs typeface="+mn-lt"/>
-              </a:rPr>
-              <a:t>".</a:t>
+              <a:t>: "part1_recommendation_system_exercises.ipynb".</a:t>
             </a:r>
             <a:endParaRPr lang="pt-PT" dirty="0"/>
           </a:p>

</xml_diff>